<commit_message>
revision after co-author feedback
</commit_message>
<xml_diff>
--- a/manuscript_version_2/Figure1.pptx
+++ b/manuscript_version_2/Figure1.pptx
@@ -1052,6 +1052,11 @@
     <dgm:pt modelId="{A836B913-61AC-469F-A301-4D9ACEDA89C9}">
       <dgm:prSet phldrT="[Text]" custT="1"/>
       <dgm:spPr>
+        <a:solidFill>
+          <a:schemeClr val="bg2">
+            <a:lumMod val="90000"/>
+          </a:schemeClr>
+        </a:solidFill>
         <a:ln w="28575"/>
       </dgm:spPr>
       <dgm:t>
@@ -1121,6 +1126,11 @@
     <dgm:pt modelId="{614616D1-9AB0-4825-B4F0-E3B319A8A19C}">
       <dgm:prSet custT="1"/>
       <dgm:spPr>
+        <a:solidFill>
+          <a:schemeClr val="bg2">
+            <a:lumMod val="90000"/>
+          </a:schemeClr>
+        </a:solidFill>
         <a:ln w="28575"/>
       </dgm:spPr>
       <dgm:t>
@@ -1128,7 +1138,7 @@
         <a:lstStyle/>
         <a:p>
           <a:r>
-            <a:rPr lang="en-US" sz="1800">
+            <a:rPr lang="en-US" sz="1800" dirty="0">
               <a:solidFill>
                 <a:schemeClr val="tx1"/>
               </a:solidFill>
@@ -1138,7 +1148,7 @@
         </a:p>
         <a:p>
           <a:r>
-            <a:rPr lang="en-US" sz="1800">
+            <a:rPr lang="en-US" sz="1800" dirty="0">
               <a:solidFill>
                 <a:schemeClr val="tx1"/>
               </a:solidFill>
@@ -1239,6 +1249,11 @@
     <dgm:pt modelId="{4F908973-2012-4DBF-94AD-2D00FD02D88A}">
       <dgm:prSet custT="1"/>
       <dgm:spPr>
+        <a:solidFill>
+          <a:schemeClr val="bg2">
+            <a:lumMod val="90000"/>
+          </a:schemeClr>
+        </a:solidFill>
         <a:ln w="28575"/>
       </dgm:spPr>
       <dgm:t>
@@ -1246,7 +1261,7 @@
         <a:lstStyle/>
         <a:p>
           <a:r>
-            <a:rPr lang="en-US" sz="1800">
+            <a:rPr lang="en-US" sz="1800" dirty="0">
               <a:solidFill>
                 <a:schemeClr val="tx1"/>
               </a:solidFill>
@@ -1256,7 +1271,7 @@
         </a:p>
         <a:p>
           <a:r>
-            <a:rPr lang="en-US" sz="1800">
+            <a:rPr lang="en-US" sz="1800" dirty="0">
               <a:solidFill>
                 <a:schemeClr val="tx1"/>
               </a:solidFill>
@@ -1601,6 +1616,11 @@
     <dgm:pt modelId="{E2D7F6EE-B8EA-4AC5-9F23-A58A00294E2D}">
       <dgm:prSet custT="1"/>
       <dgm:spPr>
+        <a:solidFill>
+          <a:schemeClr val="bg2">
+            <a:lumMod val="90000"/>
+          </a:schemeClr>
+        </a:solidFill>
         <a:ln w="28575"/>
       </dgm:spPr>
       <dgm:t>
@@ -3547,11 +3567,8 @@
           </a:avLst>
         </a:prstGeom>
         <a:solidFill>
-          <a:schemeClr val="lt1">
-            <a:hueOff val="0"/>
-            <a:satOff val="0"/>
-            <a:lumOff val="0"/>
-            <a:alphaOff val="0"/>
+          <a:schemeClr val="bg2">
+            <a:lumMod val="90000"/>
           </a:schemeClr>
         </a:solidFill>
         <a:ln w="28575" cap="flat" cmpd="sng" algn="ctr">
@@ -3728,11 +3745,8 @@
           </a:avLst>
         </a:prstGeom>
         <a:solidFill>
-          <a:schemeClr val="lt1">
-            <a:hueOff val="0"/>
-            <a:satOff val="0"/>
-            <a:lumOff val="0"/>
-            <a:alphaOff val="0"/>
+          <a:schemeClr val="bg2">
+            <a:lumMod val="90000"/>
           </a:schemeClr>
         </a:solidFill>
         <a:ln w="28575" cap="flat" cmpd="sng" algn="ctr">
@@ -3777,7 +3791,7 @@
             <a:buNone/>
           </a:pPr>
           <a:r>
-            <a:rPr lang="en-US" sz="1800" kern="1200">
+            <a:rPr lang="en-US" sz="1800" kern="1200" dirty="0">
               <a:solidFill>
                 <a:schemeClr val="tx1"/>
               </a:solidFill>
@@ -3799,7 +3813,7 @@
             <a:buNone/>
           </a:pPr>
           <a:r>
-            <a:rPr lang="en-US" sz="1800" kern="1200">
+            <a:rPr lang="en-US" sz="1800" kern="1200" dirty="0">
               <a:solidFill>
                 <a:schemeClr val="tx1"/>
               </a:solidFill>
@@ -3909,11 +3923,8 @@
           </a:avLst>
         </a:prstGeom>
         <a:solidFill>
-          <a:schemeClr val="lt1">
-            <a:hueOff val="0"/>
-            <a:satOff val="0"/>
-            <a:lumOff val="0"/>
-            <a:alphaOff val="0"/>
+          <a:schemeClr val="bg2">
+            <a:lumMod val="90000"/>
           </a:schemeClr>
         </a:solidFill>
         <a:ln w="28575" cap="flat" cmpd="sng" algn="ctr">
@@ -4112,11 +4123,8 @@
           </a:avLst>
         </a:prstGeom>
         <a:solidFill>
-          <a:schemeClr val="lt1">
-            <a:hueOff val="0"/>
-            <a:satOff val="0"/>
-            <a:lumOff val="0"/>
-            <a:alphaOff val="0"/>
+          <a:schemeClr val="bg2">
+            <a:lumMod val="90000"/>
           </a:schemeClr>
         </a:solidFill>
         <a:ln w="28575" cap="flat" cmpd="sng" algn="ctr">
@@ -4161,7 +4169,7 @@
             <a:buNone/>
           </a:pPr>
           <a:r>
-            <a:rPr lang="en-US" sz="1800" kern="1200">
+            <a:rPr lang="en-US" sz="1800" kern="1200" dirty="0">
               <a:solidFill>
                 <a:schemeClr val="tx1"/>
               </a:solidFill>
@@ -4183,7 +4191,7 @@
             <a:buNone/>
           </a:pPr>
           <a:r>
-            <a:rPr lang="en-US" sz="1800" kern="1200">
+            <a:rPr lang="en-US" sz="1800" kern="1200" dirty="0">
               <a:solidFill>
                 <a:schemeClr val="tx1"/>
               </a:solidFill>
@@ -5691,7 +5699,7 @@
           <a:p>
             <a:fld id="{0D774F42-F867-45E6-92F8-D5C96C5B6EB4}" type="datetimeFigureOut">
               <a:rPr lang="nl-NL" smtClean="0"/>
-              <a:t>13-1-2020</a:t>
+              <a:t>23-1-2020</a:t>
             </a:fld>
             <a:endParaRPr lang="nl-NL"/>
           </a:p>
@@ -5861,7 +5869,7 @@
           <a:p>
             <a:fld id="{0D774F42-F867-45E6-92F8-D5C96C5B6EB4}" type="datetimeFigureOut">
               <a:rPr lang="nl-NL" smtClean="0"/>
-              <a:t>13-1-2020</a:t>
+              <a:t>23-1-2020</a:t>
             </a:fld>
             <a:endParaRPr lang="nl-NL"/>
           </a:p>
@@ -6041,7 +6049,7 @@
           <a:p>
             <a:fld id="{0D774F42-F867-45E6-92F8-D5C96C5B6EB4}" type="datetimeFigureOut">
               <a:rPr lang="nl-NL" smtClean="0"/>
-              <a:t>13-1-2020</a:t>
+              <a:t>23-1-2020</a:t>
             </a:fld>
             <a:endParaRPr lang="nl-NL"/>
           </a:p>
@@ -6211,7 +6219,7 @@
           <a:p>
             <a:fld id="{0D774F42-F867-45E6-92F8-D5C96C5B6EB4}" type="datetimeFigureOut">
               <a:rPr lang="nl-NL" smtClean="0"/>
-              <a:t>13-1-2020</a:t>
+              <a:t>23-1-2020</a:t>
             </a:fld>
             <a:endParaRPr lang="nl-NL"/>
           </a:p>
@@ -6457,7 +6465,7 @@
           <a:p>
             <a:fld id="{0D774F42-F867-45E6-92F8-D5C96C5B6EB4}" type="datetimeFigureOut">
               <a:rPr lang="nl-NL" smtClean="0"/>
-              <a:t>13-1-2020</a:t>
+              <a:t>23-1-2020</a:t>
             </a:fld>
             <a:endParaRPr lang="nl-NL"/>
           </a:p>
@@ -6689,7 +6697,7 @@
           <a:p>
             <a:fld id="{0D774F42-F867-45E6-92F8-D5C96C5B6EB4}" type="datetimeFigureOut">
               <a:rPr lang="nl-NL" smtClean="0"/>
-              <a:t>13-1-2020</a:t>
+              <a:t>23-1-2020</a:t>
             </a:fld>
             <a:endParaRPr lang="nl-NL"/>
           </a:p>
@@ -7056,7 +7064,7 @@
           <a:p>
             <a:fld id="{0D774F42-F867-45E6-92F8-D5C96C5B6EB4}" type="datetimeFigureOut">
               <a:rPr lang="nl-NL" smtClean="0"/>
-              <a:t>13-1-2020</a:t>
+              <a:t>23-1-2020</a:t>
             </a:fld>
             <a:endParaRPr lang="nl-NL"/>
           </a:p>
@@ -7174,7 +7182,7 @@
           <a:p>
             <a:fld id="{0D774F42-F867-45E6-92F8-D5C96C5B6EB4}" type="datetimeFigureOut">
               <a:rPr lang="nl-NL" smtClean="0"/>
-              <a:t>13-1-2020</a:t>
+              <a:t>23-1-2020</a:t>
             </a:fld>
             <a:endParaRPr lang="nl-NL"/>
           </a:p>
@@ -7269,7 +7277,7 @@
           <a:p>
             <a:fld id="{0D774F42-F867-45E6-92F8-D5C96C5B6EB4}" type="datetimeFigureOut">
               <a:rPr lang="nl-NL" smtClean="0"/>
-              <a:t>13-1-2020</a:t>
+              <a:t>23-1-2020</a:t>
             </a:fld>
             <a:endParaRPr lang="nl-NL"/>
           </a:p>
@@ -7546,7 +7554,7 @@
           <a:p>
             <a:fld id="{0D774F42-F867-45E6-92F8-D5C96C5B6EB4}" type="datetimeFigureOut">
               <a:rPr lang="nl-NL" smtClean="0"/>
-              <a:t>13-1-2020</a:t>
+              <a:t>23-1-2020</a:t>
             </a:fld>
             <a:endParaRPr lang="nl-NL"/>
           </a:p>
@@ -7803,7 +7811,7 @@
           <a:p>
             <a:fld id="{0D774F42-F867-45E6-92F8-D5C96C5B6EB4}" type="datetimeFigureOut">
               <a:rPr lang="nl-NL" smtClean="0"/>
-              <a:t>13-1-2020</a:t>
+              <a:t>23-1-2020</a:t>
             </a:fld>
             <a:endParaRPr lang="nl-NL"/>
           </a:p>
@@ -8016,7 +8024,7 @@
           <a:p>
             <a:fld id="{0D774F42-F867-45E6-92F8-D5C96C5B6EB4}" type="datetimeFigureOut">
               <a:rPr lang="nl-NL" smtClean="0"/>
-              <a:t>13-1-2020</a:t>
+              <a:t>23-1-2020</a:t>
             </a:fld>
             <a:endParaRPr lang="nl-NL"/>
           </a:p>
@@ -8437,7 +8445,7 @@
             <p:ph idx="1"/>
             <p:extLst>
               <p:ext uri="{D42A27DB-BD31-4B8C-83A1-F6EECF244321}">
-                <p14:modId xmlns:p14="http://schemas.microsoft.com/office/powerpoint/2010/main" val="1433935570"/>
+                <p14:modId xmlns:p14="http://schemas.microsoft.com/office/powerpoint/2010/main" val="4008133212"/>
               </p:ext>
             </p:extLst>
           </p:nvPr>

</xml_diff>